<commit_message>
Proje özet hazırlama başlangıç
</commit_message>
<xml_diff>
--- a/Version Control Protocols.pptx
+++ b/Version Control Protocols.pptx
@@ -5973,11 +5973,7 @@
           <a:p>
             <a:r>
               <a:rPr lang="tr-TR" dirty="0" smtClean="0"/>
-              <a:t>Operations </a:t>
-            </a:r>
-            <a:r>
-              <a:rPr lang="tr-TR" dirty="0" smtClean="0"/>
-              <a:t>of </a:t>
+              <a:t>Operations of </a:t>
             </a:r>
             <a:r>
               <a:rPr lang="tr-TR" dirty="0" err="1" smtClean="0"/>
@@ -6880,54 +6876,6 @@
               <a:t> to which your whole team has access, setting up a repository is very easy. </a:t>
             </a:r>
           </a:p>
-          <a:p>
-            <a:pPr marL="0" indent="0" algn="just">
-              <a:buNone/>
-            </a:pPr>
-            <a:endParaRPr lang="tr-TR" dirty="0" smtClean="0"/>
-          </a:p>
-          <a:p>
-            <a:pPr algn="just"/>
-            <a:r>
-              <a:rPr lang="en-US" b="1" dirty="0" smtClean="0">
-                <a:solidFill>
-                  <a:srgbClr val="FF0000"/>
-                </a:solidFill>
-              </a:rPr>
-              <a:t>HTTP</a:t>
-            </a:r>
-            <a:r>
-              <a:rPr lang="tr-TR" dirty="0" smtClean="0">
-                <a:sym typeface="Wingdings" panose="05000000000000000000" pitchFamily="2" charset="2"/>
-              </a:rPr>
-              <a:t> </a:t>
-            </a:r>
-            <a:r>
-              <a:rPr lang="tr-TR" dirty="0" err="1" smtClean="0">
-                <a:sym typeface="Wingdings" panose="05000000000000000000" pitchFamily="2" charset="2"/>
-              </a:rPr>
-              <a:t>Dumb</a:t>
-            </a:r>
-            <a:r>
-              <a:rPr lang="tr-TR" dirty="0" smtClean="0">
-                <a:sym typeface="Wingdings" panose="05000000000000000000" pitchFamily="2" charset="2"/>
-              </a:rPr>
-              <a:t> HTTP </a:t>
-            </a:r>
-            <a:r>
-              <a:rPr lang="tr-TR" dirty="0" smtClean="0"/>
-              <a:t>Smart </a:t>
-            </a:r>
-            <a:r>
-              <a:rPr lang="tr-TR" dirty="0"/>
-              <a:t>HTTP </a:t>
-            </a:r>
-            <a:r>
-              <a:rPr lang="tr-TR" dirty="0" smtClean="0"/>
-              <a:t>,</a:t>
-            </a:r>
-            <a:endParaRPr lang="tr-TR" dirty="0"/>
-          </a:p>
         </p:txBody>
       </p:sp>
     </p:spTree>
@@ -7030,7 +6978,7 @@
         <p:spPr>
           <a:xfrm>
             <a:off x="838200" y="963168"/>
-            <a:ext cx="11268456" cy="6132576"/>
+            <a:ext cx="11268456" cy="5644896"/>
           </a:xfrm>
         </p:spPr>
         <p:txBody>
@@ -7039,11 +6987,44 @@
           </a:bodyPr>
           <a:lstStyle/>
           <a:p>
+            <a:pPr algn="just"/>
+            <a:r>
+              <a:rPr lang="en-US" b="1" dirty="0" smtClean="0">
+                <a:solidFill>
+                  <a:srgbClr val="FF0000"/>
+                </a:solidFill>
+              </a:rPr>
+              <a:t>HTTP</a:t>
+            </a:r>
+            <a:r>
+              <a:rPr lang="tr-TR" dirty="0">
+                <a:sym typeface="Wingdings" panose="05000000000000000000" pitchFamily="2" charset="2"/>
+              </a:rPr>
+              <a:t> </a:t>
+            </a:r>
+            <a:r>
+              <a:rPr lang="tr-TR" dirty="0" err="1">
+                <a:sym typeface="Wingdings" panose="05000000000000000000" pitchFamily="2" charset="2"/>
+              </a:rPr>
+              <a:t>Dumb</a:t>
+            </a:r>
+            <a:r>
+              <a:rPr lang="tr-TR" dirty="0">
+                <a:sym typeface="Wingdings" panose="05000000000000000000" pitchFamily="2" charset="2"/>
+              </a:rPr>
+              <a:t> HTTP </a:t>
+            </a:r>
+            <a:r>
+              <a:rPr lang="tr-TR" dirty="0"/>
+              <a:t>Smart HTTP ,</a:t>
+            </a:r>
+          </a:p>
+          <a:p>
             <a:pPr marL="0" indent="0" algn="just">
               <a:buNone/>
             </a:pPr>
             <a:r>
-              <a:rPr lang="tr-TR" b="1" dirty="0"/>
+              <a:rPr lang="tr-TR" b="1" dirty="0" smtClean="0"/>
               <a:t> </a:t>
             </a:r>
             <a:r>
@@ -7153,13 +7134,6 @@
               <a:rPr lang="tr-TR" dirty="0"/>
               <a:t>	</a:t>
             </a:r>
-            <a:endParaRPr lang="tr-TR" dirty="0" smtClean="0"/>
-          </a:p>
-          <a:p>
-            <a:pPr marL="0" indent="0" algn="just">
-              <a:buNone/>
-            </a:pPr>
-            <a:endParaRPr lang="tr-TR" dirty="0"/>
           </a:p>
           <a:p>
             <a:pPr marL="0" indent="0" algn="just">
@@ -7205,7 +7179,7 @@
         </p:blipFill>
         <p:spPr>
           <a:xfrm>
-            <a:off x="6587321" y="3728466"/>
+            <a:off x="7562681" y="4029456"/>
             <a:ext cx="4409863" cy="2220886"/>
           </a:xfrm>
           <a:prstGeom prst="rect">
@@ -8077,7 +8051,7 @@
         </p:nvSpPr>
         <p:spPr>
           <a:xfrm>
-            <a:off x="280416" y="585216"/>
+            <a:off x="646176" y="585216"/>
             <a:ext cx="11073384" cy="6272784"/>
           </a:xfrm>
         </p:spPr>
@@ -8097,6 +8071,29 @@
             <a:r>
               <a:rPr lang="en-US" sz="1800" dirty="0"/>
               <a:t>It supports atomic commits </a:t>
+            </a:r>
+            <a:endParaRPr lang="tr-TR" sz="1800" dirty="0" smtClean="0"/>
+          </a:p>
+          <a:p>
+            <a:r>
+              <a:rPr lang="tr-TR" sz="1800" dirty="0" err="1" smtClean="0"/>
+              <a:t>Less</a:t>
+            </a:r>
+            <a:r>
+              <a:rPr lang="tr-TR" sz="1800" dirty="0" smtClean="0"/>
+              <a:t> </a:t>
+            </a:r>
+            <a:r>
+              <a:rPr lang="tr-TR" sz="1800" dirty="0" err="1" smtClean="0"/>
+              <a:t>storage</a:t>
+            </a:r>
+            <a:r>
+              <a:rPr lang="tr-TR" sz="1800" dirty="0" smtClean="0"/>
+              <a:t> </a:t>
+            </a:r>
+            <a:r>
+              <a:rPr lang="tr-TR" sz="1800" dirty="0" err="1" smtClean="0"/>
+              <a:t>area</a:t>
             </a:r>
             <a:endParaRPr lang="tr-TR" sz="1800" dirty="0"/>
           </a:p>
@@ -8154,8 +8151,8 @@
         </p:blipFill>
         <p:spPr>
           <a:xfrm>
-            <a:off x="2731008" y="2325515"/>
-            <a:ext cx="5096256" cy="3974004"/>
+            <a:off x="3377184" y="2525165"/>
+            <a:ext cx="4840224" cy="3774353"/>
           </a:xfrm>
           <a:prstGeom prst="rect">
             <a:avLst/>
@@ -9323,11 +9320,7 @@
             </a:r>
             <a:r>
               <a:rPr lang="en-US" dirty="0" smtClean="0"/>
-              <a:t> </a:t>
-            </a:r>
-            <a:r>
-              <a:rPr lang="en-US" dirty="0" smtClean="0"/>
-              <a:t>software</a:t>
+              <a:t> software</a:t>
             </a:r>
             <a:endParaRPr lang="tr-TR" dirty="0" smtClean="0"/>
           </a:p>

</xml_diff>